<commit_message>
Version sent to Ian post other authors' comments
</commit_message>
<xml_diff>
--- a/Presentation1.pptx
+++ b/Presentation1.pptx
@@ -8,7 +8,7 @@
     <p:sldId id="256" r:id="rId2"/>
   </p:sldIdLst>
   <p:sldSz cx="12192000" cy="6858000"/>
-  <p:notesSz cx="6858000" cy="9144000"/>
+  <p:notesSz cx="7315200" cy="9601200"/>
   <p:defaultTextStyle>
     <a:defPPr>
       <a:defRPr lang="en-US"/>
@@ -104,6 +104,11 @@
       </a:defRPr>
     </a:lvl9pPr>
   </p:defaultTextStyle>
+  <p:extLst>
+    <p:ext uri="{EFAFB233-063F-42B5-8137-9DF3F51BA10A}">
+      <p15:sldGuideLst xmlns:p15="http://schemas.microsoft.com/office/powerpoint/2012/main"/>
+    </p:ext>
+  </p:extLst>
 </p:presentation>
 </file>
 
@@ -238,7 +243,7 @@
           <a:p>
             <a:fld id="{D61CA99B-1A52-41E4-BE43-6641B2C1149F}" type="datetimeFigureOut">
               <a:rPr lang="en-US" smtClean="0"/>
-              <a:t>2/10/2015</a:t>
+              <a:t>6/22/2015</a:t>
             </a:fld>
             <a:endParaRPr lang="en-US"/>
           </a:p>
@@ -408,7 +413,7 @@
           <a:p>
             <a:fld id="{D61CA99B-1A52-41E4-BE43-6641B2C1149F}" type="datetimeFigureOut">
               <a:rPr lang="en-US" smtClean="0"/>
-              <a:t>2/10/2015</a:t>
+              <a:t>6/22/2015</a:t>
             </a:fld>
             <a:endParaRPr lang="en-US"/>
           </a:p>
@@ -588,7 +593,7 @@
           <a:p>
             <a:fld id="{D61CA99B-1A52-41E4-BE43-6641B2C1149F}" type="datetimeFigureOut">
               <a:rPr lang="en-US" smtClean="0"/>
-              <a:t>2/10/2015</a:t>
+              <a:t>6/22/2015</a:t>
             </a:fld>
             <a:endParaRPr lang="en-US"/>
           </a:p>
@@ -758,7 +763,7 @@
           <a:p>
             <a:fld id="{D61CA99B-1A52-41E4-BE43-6641B2C1149F}" type="datetimeFigureOut">
               <a:rPr lang="en-US" smtClean="0"/>
-              <a:t>2/10/2015</a:t>
+              <a:t>6/22/2015</a:t>
             </a:fld>
             <a:endParaRPr lang="en-US"/>
           </a:p>
@@ -1004,7 +1009,7 @@
           <a:p>
             <a:fld id="{D61CA99B-1A52-41E4-BE43-6641B2C1149F}" type="datetimeFigureOut">
               <a:rPr lang="en-US" smtClean="0"/>
-              <a:t>2/10/2015</a:t>
+              <a:t>6/22/2015</a:t>
             </a:fld>
             <a:endParaRPr lang="en-US"/>
           </a:p>
@@ -1236,7 +1241,7 @@
           <a:p>
             <a:fld id="{D61CA99B-1A52-41E4-BE43-6641B2C1149F}" type="datetimeFigureOut">
               <a:rPr lang="en-US" smtClean="0"/>
-              <a:t>2/10/2015</a:t>
+              <a:t>6/22/2015</a:t>
             </a:fld>
             <a:endParaRPr lang="en-US"/>
           </a:p>
@@ -1603,7 +1608,7 @@
           <a:p>
             <a:fld id="{D61CA99B-1A52-41E4-BE43-6641B2C1149F}" type="datetimeFigureOut">
               <a:rPr lang="en-US" smtClean="0"/>
-              <a:t>2/10/2015</a:t>
+              <a:t>6/22/2015</a:t>
             </a:fld>
             <a:endParaRPr lang="en-US"/>
           </a:p>
@@ -1721,7 +1726,7 @@
           <a:p>
             <a:fld id="{D61CA99B-1A52-41E4-BE43-6641B2C1149F}" type="datetimeFigureOut">
               <a:rPr lang="en-US" smtClean="0"/>
-              <a:t>2/10/2015</a:t>
+              <a:t>6/22/2015</a:t>
             </a:fld>
             <a:endParaRPr lang="en-US"/>
           </a:p>
@@ -1816,7 +1821,7 @@
           <a:p>
             <a:fld id="{D61CA99B-1A52-41E4-BE43-6641B2C1149F}" type="datetimeFigureOut">
               <a:rPr lang="en-US" smtClean="0"/>
-              <a:t>2/10/2015</a:t>
+              <a:t>6/22/2015</a:t>
             </a:fld>
             <a:endParaRPr lang="en-US"/>
           </a:p>
@@ -2093,7 +2098,7 @@
           <a:p>
             <a:fld id="{D61CA99B-1A52-41E4-BE43-6641B2C1149F}" type="datetimeFigureOut">
               <a:rPr lang="en-US" smtClean="0"/>
-              <a:t>2/10/2015</a:t>
+              <a:t>6/22/2015</a:t>
             </a:fld>
             <a:endParaRPr lang="en-US"/>
           </a:p>
@@ -2346,7 +2351,7 @@
           <a:p>
             <a:fld id="{D61CA99B-1A52-41E4-BE43-6641B2C1149F}" type="datetimeFigureOut">
               <a:rPr lang="en-US" smtClean="0"/>
-              <a:t>2/10/2015</a:t>
+              <a:t>6/22/2015</a:t>
             </a:fld>
             <a:endParaRPr lang="en-US"/>
           </a:p>
@@ -2559,7 +2564,7 @@
           <a:p>
             <a:fld id="{D61CA99B-1A52-41E4-BE43-6641B2C1149F}" type="datetimeFigureOut">
               <a:rPr lang="en-US" smtClean="0"/>
-              <a:t>2/10/2015</a:t>
+              <a:t>6/22/2015</a:t>
             </a:fld>
             <a:endParaRPr lang="en-US"/>
           </a:p>
@@ -3335,32 +3340,12 @@
           <a:prstGeom prst="rect">
             <a:avLst/>
           </a:prstGeom>
-          <a:gradFill flip="none" rotWithShape="1">
-            <a:gsLst>
-              <a:gs pos="0">
-                <a:schemeClr val="accent1">
-                  <a:tint val="66000"/>
-                  <a:satMod val="160000"/>
-                </a:schemeClr>
-              </a:gs>
-              <a:gs pos="50000">
-                <a:schemeClr val="accent1">
-                  <a:tint val="44500"/>
-                  <a:satMod val="160000"/>
-                </a:schemeClr>
-              </a:gs>
-              <a:gs pos="100000">
-                <a:schemeClr val="accent1">
-                  <a:tint val="23500"/>
-                  <a:satMod val="160000"/>
-                </a:schemeClr>
-              </a:gs>
-            </a:gsLst>
-            <a:path path="circle">
-              <a:fillToRect l="50000" t="50000" r="50000" b="50000"/>
-            </a:path>
-            <a:tileRect/>
-          </a:gradFill>
+          <a:solidFill>
+            <a:schemeClr val="accent1">
+              <a:lumMod val="20000"/>
+              <a:lumOff val="80000"/>
+            </a:schemeClr>
+          </a:solidFill>
           <a:scene3d>
             <a:camera prst="isometricLeftDown"/>
             <a:lightRig rig="threePt" dir="t"/>
@@ -3410,15 +3395,13 @@
           </a:prstGeom>
           <a:gradFill flip="none" rotWithShape="1">
             <a:gsLst>
+              <a:gs pos="0">
+                <a:schemeClr val="tx1"/>
+              </a:gs>
               <a:gs pos="100000">
-                <a:schemeClr val="accent1"/>
-              </a:gs>
-              <a:gs pos="0">
-                <a:schemeClr val="accent6">
-                  <a:tint val="55000"/>
-                  <a:satMod val="140000"/>
-                  <a:lumMod val="0"/>
-                  <a:lumOff val="100000"/>
+                <a:schemeClr val="accent1">
+                  <a:lumMod val="20000"/>
+                  <a:lumOff val="80000"/>
                 </a:schemeClr>
               </a:gs>
             </a:gsLst>
@@ -3524,13 +3507,13 @@
               <a:gs pos="0">
                 <a:schemeClr val="accent1"/>
               </a:gs>
-              <a:gs pos="66000">
+              <a:gs pos="100000">
                 <a:schemeClr val="accent1">
-                  <a:tint val="44500"/>
-                  <a:satMod val="160000"/>
+                  <a:lumMod val="20000"/>
+                  <a:lumOff val="80000"/>
                 </a:schemeClr>
               </a:gs>
-              <a:gs pos="100000">
+              <a:gs pos="68000">
                 <a:schemeClr val="accent1">
                   <a:tint val="23500"/>
                   <a:satMod val="160000"/>

</xml_diff>